<commit_message>
added htaccess robots and compressd js and css
</commit_message>
<xml_diff>
--- a/images/slideshow1.pptx
+++ b/images/slideshow1.pptx
@@ -8,6 +8,9 @@
     <p:sldId id="256" r:id="rId2"/>
     <p:sldId id="257" r:id="rId3"/>
     <p:sldId id="258" r:id="rId4"/>
+    <p:sldId id="259" r:id="rId5"/>
+    <p:sldId id="260" r:id="rId6"/>
+    <p:sldId id="261" r:id="rId7"/>
   </p:sldIdLst>
   <p:sldSz cx="12192000" cy="6858000"/>
   <p:notesSz cx="6858000" cy="9144000"/>
@@ -106,6 +109,11 @@
       </a:defRPr>
     </a:lvl9pPr>
   </p:defaultTextStyle>
+  <p:extLst>
+    <p:ext uri="{EFAFB233-063F-42B5-8137-9DF3F51BA10A}">
+      <p15:sldGuideLst xmlns:p15="http://schemas.microsoft.com/office/powerpoint/2012/main"/>
+    </p:ext>
+  </p:extLst>
 </p:presentation>
 </file>
 
@@ -240,7 +248,7 @@
           <a:p>
             <a:fld id="{53839EF1-2D67-4744-8CEF-860F5F1FC532}" type="datetimeFigureOut">
               <a:rPr lang="he-IL" smtClean="0"/>
-              <a:t>ד'/תמוז/תשע"ז</a:t>
+              <a:t>ה'/תמוז/תשע"ז</a:t>
             </a:fld>
             <a:endParaRPr lang="he-IL"/>
           </a:p>
@@ -410,7 +418,7 @@
           <a:p>
             <a:fld id="{53839EF1-2D67-4744-8CEF-860F5F1FC532}" type="datetimeFigureOut">
               <a:rPr lang="he-IL" smtClean="0"/>
-              <a:t>ד'/תמוז/תשע"ז</a:t>
+              <a:t>ה'/תמוז/תשע"ז</a:t>
             </a:fld>
             <a:endParaRPr lang="he-IL"/>
           </a:p>
@@ -590,7 +598,7 @@
           <a:p>
             <a:fld id="{53839EF1-2D67-4744-8CEF-860F5F1FC532}" type="datetimeFigureOut">
               <a:rPr lang="he-IL" smtClean="0"/>
-              <a:t>ד'/תמוז/תשע"ז</a:t>
+              <a:t>ה'/תמוז/תשע"ז</a:t>
             </a:fld>
             <a:endParaRPr lang="he-IL"/>
           </a:p>
@@ -760,7 +768,7 @@
           <a:p>
             <a:fld id="{53839EF1-2D67-4744-8CEF-860F5F1FC532}" type="datetimeFigureOut">
               <a:rPr lang="he-IL" smtClean="0"/>
-              <a:t>ד'/תמוז/תשע"ז</a:t>
+              <a:t>ה'/תמוז/תשע"ז</a:t>
             </a:fld>
             <a:endParaRPr lang="he-IL"/>
           </a:p>
@@ -1006,7 +1014,7 @@
           <a:p>
             <a:fld id="{53839EF1-2D67-4744-8CEF-860F5F1FC532}" type="datetimeFigureOut">
               <a:rPr lang="he-IL" smtClean="0"/>
-              <a:t>ד'/תמוז/תשע"ז</a:t>
+              <a:t>ה'/תמוז/תשע"ז</a:t>
             </a:fld>
             <a:endParaRPr lang="he-IL"/>
           </a:p>
@@ -1238,7 +1246,7 @@
           <a:p>
             <a:fld id="{53839EF1-2D67-4744-8CEF-860F5F1FC532}" type="datetimeFigureOut">
               <a:rPr lang="he-IL" smtClean="0"/>
-              <a:t>ד'/תמוז/תשע"ז</a:t>
+              <a:t>ה'/תמוז/תשע"ז</a:t>
             </a:fld>
             <a:endParaRPr lang="he-IL"/>
           </a:p>
@@ -1605,7 +1613,7 @@
           <a:p>
             <a:fld id="{53839EF1-2D67-4744-8CEF-860F5F1FC532}" type="datetimeFigureOut">
               <a:rPr lang="he-IL" smtClean="0"/>
-              <a:t>ד'/תמוז/תשע"ז</a:t>
+              <a:t>ה'/תמוז/תשע"ז</a:t>
             </a:fld>
             <a:endParaRPr lang="he-IL"/>
           </a:p>
@@ -1723,7 +1731,7 @@
           <a:p>
             <a:fld id="{53839EF1-2D67-4744-8CEF-860F5F1FC532}" type="datetimeFigureOut">
               <a:rPr lang="he-IL" smtClean="0"/>
-              <a:t>ד'/תמוז/תשע"ז</a:t>
+              <a:t>ה'/תמוז/תשע"ז</a:t>
             </a:fld>
             <a:endParaRPr lang="he-IL"/>
           </a:p>
@@ -1818,7 +1826,7 @@
           <a:p>
             <a:fld id="{53839EF1-2D67-4744-8CEF-860F5F1FC532}" type="datetimeFigureOut">
               <a:rPr lang="he-IL" smtClean="0"/>
-              <a:t>ד'/תמוז/תשע"ז</a:t>
+              <a:t>ה'/תמוז/תשע"ז</a:t>
             </a:fld>
             <a:endParaRPr lang="he-IL"/>
           </a:p>
@@ -2095,7 +2103,7 @@
           <a:p>
             <a:fld id="{53839EF1-2D67-4744-8CEF-860F5F1FC532}" type="datetimeFigureOut">
               <a:rPr lang="he-IL" smtClean="0"/>
-              <a:t>ד'/תמוז/תשע"ז</a:t>
+              <a:t>ה'/תמוז/תשע"ז</a:t>
             </a:fld>
             <a:endParaRPr lang="he-IL"/>
           </a:p>
@@ -2348,7 +2356,7 @@
           <a:p>
             <a:fld id="{53839EF1-2D67-4744-8CEF-860F5F1FC532}" type="datetimeFigureOut">
               <a:rPr lang="he-IL" smtClean="0"/>
-              <a:t>ד'/תמוז/תשע"ז</a:t>
+              <a:t>ה'/תמוז/תשע"ז</a:t>
             </a:fld>
             <a:endParaRPr lang="he-IL"/>
           </a:p>
@@ -2561,7 +2569,7 @@
           <a:p>
             <a:fld id="{53839EF1-2D67-4744-8CEF-860F5F1FC532}" type="datetimeFigureOut">
               <a:rPr lang="he-IL" smtClean="0"/>
-              <a:t>ד'/תמוז/תשע"ז</a:t>
+              <a:t>ה'/תמוז/תשע"ז</a:t>
             </a:fld>
             <a:endParaRPr lang="he-IL"/>
           </a:p>
@@ -3691,6 +3699,212 @@
 </p:sld>
 </file>
 
+<file path=ppt/slides/slide4.xml><?xml version="1.0" encoding="utf-8"?>
+<p:sld xmlns:a="http://schemas.openxmlformats.org/drawingml/2006/main" xmlns:r="http://schemas.openxmlformats.org/officeDocument/2006/relationships" xmlns:p="http://schemas.openxmlformats.org/presentationml/2006/main">
+  <p:cSld>
+    <p:spTree>
+      <p:nvGrpSpPr>
+        <p:cNvPr id="1" name=""/>
+        <p:cNvGrpSpPr/>
+        <p:nvPr/>
+      </p:nvGrpSpPr>
+      <p:grpSpPr>
+        <a:xfrm>
+          <a:off x="0" y="0"/>
+          <a:ext cx="0" cy="0"/>
+          <a:chOff x="0" y="0"/>
+          <a:chExt cx="0" cy="0"/>
+        </a:xfrm>
+      </p:grpSpPr>
+      <p:pic>
+        <p:nvPicPr>
+          <p:cNvPr id="8" name="תמונה 7"/>
+          <p:cNvPicPr>
+            <a:picLocks noChangeAspect="1"/>
+          </p:cNvPicPr>
+          <p:nvPr/>
+        </p:nvPicPr>
+        <p:blipFill rotWithShape="1">
+          <a:blip r:embed="rId2">
+            <a:extLst>
+              <a:ext uri="{28A0092B-C50C-407E-A947-70E740481C1C}">
+                <a14:useLocalDpi xmlns:a14="http://schemas.microsoft.com/office/drawing/2010/main" val="0"/>
+              </a:ext>
+            </a:extLst>
+          </a:blip>
+          <a:srcRect t="12651" b="5653"/>
+          <a:stretch/>
+        </p:blipFill>
+        <p:spPr>
+          <a:xfrm>
+            <a:off x="2447228" y="1787236"/>
+            <a:ext cx="7297544" cy="3591099"/>
+          </a:xfrm>
+          <a:prstGeom prst="rect">
+            <a:avLst/>
+          </a:prstGeom>
+        </p:spPr>
+      </p:pic>
+    </p:spTree>
+    <p:extLst>
+      <p:ext uri="{BB962C8B-B14F-4D97-AF65-F5344CB8AC3E}">
+        <p14:creationId xmlns:p14="http://schemas.microsoft.com/office/powerpoint/2010/main" val="906673156"/>
+      </p:ext>
+    </p:extLst>
+  </p:cSld>
+  <p:clrMapOvr>
+    <a:masterClrMapping/>
+  </p:clrMapOvr>
+</p:sld>
+</file>
+
+<file path=ppt/slides/slide5.xml><?xml version="1.0" encoding="utf-8"?>
+<p:sld xmlns:a="http://schemas.openxmlformats.org/drawingml/2006/main" xmlns:r="http://schemas.openxmlformats.org/officeDocument/2006/relationships" xmlns:p="http://schemas.openxmlformats.org/presentationml/2006/main">
+  <p:cSld>
+    <p:spTree>
+      <p:nvGrpSpPr>
+        <p:cNvPr id="1" name=""/>
+        <p:cNvGrpSpPr/>
+        <p:nvPr/>
+      </p:nvGrpSpPr>
+      <p:grpSpPr>
+        <a:xfrm>
+          <a:off x="0" y="0"/>
+          <a:ext cx="0" cy="0"/>
+          <a:chOff x="0" y="0"/>
+          <a:chExt cx="0" cy="0"/>
+        </a:xfrm>
+      </p:grpSpPr>
+      <p:pic>
+        <p:nvPicPr>
+          <p:cNvPr id="4" name="תמונה 3"/>
+          <p:cNvPicPr>
+            <a:picLocks noChangeAspect="1"/>
+          </p:cNvPicPr>
+          <p:nvPr/>
+        </p:nvPicPr>
+        <p:blipFill rotWithShape="1">
+          <a:blip r:embed="rId2" cstate="print">
+            <a:extLst>
+              <a:ext uri="{28A0092B-C50C-407E-A947-70E740481C1C}">
+                <a14:useLocalDpi xmlns:a14="http://schemas.microsoft.com/office/drawing/2010/main" val="0"/>
+              </a:ext>
+            </a:extLst>
+          </a:blip>
+          <a:srcRect l="1607" t="27295" r="30940" b="27705"/>
+          <a:stretch/>
+        </p:blipFill>
+        <p:spPr>
+          <a:xfrm>
+            <a:off x="1670857" y="3915295"/>
+            <a:ext cx="1962555" cy="872835"/>
+          </a:xfrm>
+          <a:prstGeom prst="rect">
+            <a:avLst/>
+          </a:prstGeom>
+        </p:spPr>
+      </p:pic>
+      <p:pic>
+        <p:nvPicPr>
+          <p:cNvPr id="3" name="תמונה 2"/>
+          <p:cNvPicPr>
+            <a:picLocks noChangeAspect="1"/>
+          </p:cNvPicPr>
+          <p:nvPr/>
+        </p:nvPicPr>
+        <p:blipFill rotWithShape="1">
+          <a:blip r:embed="rId3" cstate="print">
+            <a:extLst>
+              <a:ext uri="{28A0092B-C50C-407E-A947-70E740481C1C}">
+                <a14:useLocalDpi xmlns:a14="http://schemas.microsoft.com/office/drawing/2010/main" val="0"/>
+              </a:ext>
+            </a:extLst>
+          </a:blip>
+          <a:srcRect t="19815" b="13894"/>
+          <a:stretch/>
+        </p:blipFill>
+        <p:spPr>
+          <a:xfrm>
+            <a:off x="1670857" y="2996462"/>
+            <a:ext cx="1962555" cy="918832"/>
+          </a:xfrm>
+          <a:prstGeom prst="rect">
+            <a:avLst/>
+          </a:prstGeom>
+        </p:spPr>
+      </p:pic>
+    </p:spTree>
+    <p:extLst>
+      <p:ext uri="{BB962C8B-B14F-4D97-AF65-F5344CB8AC3E}">
+        <p14:creationId xmlns:p14="http://schemas.microsoft.com/office/powerpoint/2010/main" val="4007995202"/>
+      </p:ext>
+    </p:extLst>
+  </p:cSld>
+  <p:clrMapOvr>
+    <a:masterClrMapping/>
+  </p:clrMapOvr>
+</p:sld>
+</file>
+
+<file path=ppt/slides/slide6.xml><?xml version="1.0" encoding="utf-8"?>
+<p:sld xmlns:a="http://schemas.openxmlformats.org/drawingml/2006/main" xmlns:r="http://schemas.openxmlformats.org/officeDocument/2006/relationships" xmlns:p="http://schemas.openxmlformats.org/presentationml/2006/main">
+  <p:cSld>
+    <p:spTree>
+      <p:nvGrpSpPr>
+        <p:cNvPr id="1" name=""/>
+        <p:cNvGrpSpPr/>
+        <p:nvPr/>
+      </p:nvGrpSpPr>
+      <p:grpSpPr>
+        <a:xfrm>
+          <a:off x="0" y="0"/>
+          <a:ext cx="0" cy="0"/>
+          <a:chOff x="0" y="0"/>
+          <a:chExt cx="0" cy="0"/>
+        </a:xfrm>
+      </p:grpSpPr>
+      <p:pic>
+        <p:nvPicPr>
+          <p:cNvPr id="4" name="תמונה 3"/>
+          <p:cNvPicPr>
+            <a:picLocks noChangeAspect="1"/>
+          </p:cNvPicPr>
+          <p:nvPr/>
+        </p:nvPicPr>
+        <p:blipFill rotWithShape="1">
+          <a:blip r:embed="rId2">
+            <a:extLst>
+              <a:ext uri="{28A0092B-C50C-407E-A947-70E740481C1C}">
+                <a14:useLocalDpi xmlns:a14="http://schemas.microsoft.com/office/drawing/2010/main" val="0"/>
+              </a:ext>
+            </a:extLst>
+          </a:blip>
+          <a:srcRect t="19815" b="13894"/>
+          <a:stretch/>
+        </p:blipFill>
+        <p:spPr>
+          <a:xfrm>
+            <a:off x="1524000" y="3839435"/>
+            <a:ext cx="4103716" cy="1921285"/>
+          </a:xfrm>
+          <a:prstGeom prst="rect">
+            <a:avLst/>
+          </a:prstGeom>
+        </p:spPr>
+      </p:pic>
+    </p:spTree>
+    <p:extLst>
+      <p:ext uri="{BB962C8B-B14F-4D97-AF65-F5344CB8AC3E}">
+        <p14:creationId xmlns:p14="http://schemas.microsoft.com/office/powerpoint/2010/main" val="3308448740"/>
+      </p:ext>
+    </p:extLst>
+  </p:cSld>
+  <p:clrMapOvr>
+    <a:masterClrMapping/>
+  </p:clrMapOvr>
+</p:sld>
+</file>
+
 <file path=ppt/theme/theme1.xml><?xml version="1.0" encoding="utf-8"?>
 <a:theme xmlns:a="http://schemas.openxmlformats.org/drawingml/2006/main" name="ערכת נושא Office">
   <a:themeElements>

</xml_diff>